<commit_message>
kleine Aenderung an der Präsentation vorgenommen
</commit_message>
<xml_diff>
--- a/Doku/Drei-Schicht Anwendung.pptx
+++ b/Doku/Drei-Schicht Anwendung.pptx
@@ -2864,7 +2864,7 @@
             <a:pPr rtl="0"/>
             <a:fld id="{754A2EA4-0B56-441C-A9D3-5AD09C9F1422}" type="datetime1">
               <a:rPr lang="de-DE" smtClean="0"/>
-              <a:t>06.12.2024</a:t>
+              <a:t>09.12.2024</a:t>
             </a:fld>
             <a:endParaRPr lang="de-DE"/>
           </a:p>
@@ -3046,7 +3046,7 @@
             <a:fld id="{01B085CE-6145-404E-B599-68FDF26648DF}" type="datetime1">
               <a:rPr lang="de-DE" smtClean="0"/>
               <a:pPr/>
-              <a:t>06.12.2024</a:t>
+              <a:t>09.12.2024</a:t>
             </a:fld>
             <a:endParaRPr lang="de-DE" dirty="0"/>
           </a:p>
@@ -4673,7 +4673,7 @@
             <a:pPr rtl="0"/>
             <a:fld id="{B08B9DE0-E2FE-41BD-AB92-B84C47372BE1}" type="datetime1">
               <a:rPr lang="de-DE" noProof="0" smtClean="0"/>
-              <a:t>06.12.2024</a:t>
+              <a:t>09.12.2024</a:t>
             </a:fld>
             <a:endParaRPr lang="de-DE" noProof="0"/>
           </a:p>
@@ -4938,7 +4938,7 @@
             <a:pPr rtl="0"/>
             <a:fld id="{A88C9DED-60B2-4391-BC14-263FF77B28E6}" type="datetime1">
               <a:rPr lang="de-DE" noProof="0" smtClean="0"/>
-              <a:t>06.12.2024</a:t>
+              <a:t>09.12.2024</a:t>
             </a:fld>
             <a:endParaRPr lang="de-DE" noProof="0"/>
           </a:p>
@@ -5176,7 +5176,7 @@
             <a:pPr rtl="0"/>
             <a:fld id="{B58FA92C-55BF-465D-89D9-21B486404468}" type="datetime1">
               <a:rPr lang="de-DE" noProof="0" smtClean="0"/>
-              <a:t>06.12.2024</a:t>
+              <a:t>09.12.2024</a:t>
             </a:fld>
             <a:endParaRPr lang="de-DE" noProof="0"/>
           </a:p>
@@ -5419,7 +5419,7 @@
             <a:pPr rtl="0"/>
             <a:fld id="{F59730D2-E5E8-4D98-99E6-CE134DF28154}" type="datetime1">
               <a:rPr lang="de-DE" noProof="0" smtClean="0"/>
-              <a:t>06.12.2024</a:t>
+              <a:t>09.12.2024</a:t>
             </a:fld>
             <a:endParaRPr lang="de-DE" noProof="0"/>
           </a:p>
@@ -5730,7 +5730,7 @@
             <a:pPr rtl="0"/>
             <a:fld id="{498FC8F7-3E82-4878-9BD3-BEF7AA8B88AA}" type="datetime1">
               <a:rPr lang="de-DE" noProof="0" smtClean="0"/>
-              <a:t>06.12.2024</a:t>
+              <a:t>09.12.2024</a:t>
             </a:fld>
             <a:endParaRPr lang="de-DE" noProof="0"/>
           </a:p>
@@ -6034,7 +6034,7 @@
             <a:pPr rtl="0"/>
             <a:fld id="{C6479528-1739-4F41-A8B9-D328989E648C}" type="datetime1">
               <a:rPr lang="de-DE" noProof="0" smtClean="0"/>
-              <a:t>06.12.2024</a:t>
+              <a:t>09.12.2024</a:t>
             </a:fld>
             <a:endParaRPr lang="de-DE" noProof="0"/>
           </a:p>
@@ -6458,7 +6458,7 @@
             <a:pPr rtl="0"/>
             <a:fld id="{47230D91-16CB-40AB-8BFD-571D67AB6673}" type="datetime1">
               <a:rPr lang="de-DE" noProof="0" smtClean="0"/>
-              <a:t>06.12.2024</a:t>
+              <a:t>09.12.2024</a:t>
             </a:fld>
             <a:endParaRPr lang="de-DE" noProof="0"/>
           </a:p>
@@ -6557,7 +6557,7 @@
             <a:pPr rtl="0"/>
             <a:fld id="{CB9D1FB4-8596-4639-8061-EBD1138202CC}" type="datetime1">
               <a:rPr lang="de-DE" noProof="0" smtClean="0"/>
-              <a:t>06.12.2024</a:t>
+              <a:t>09.12.2024</a:t>
             </a:fld>
             <a:endParaRPr lang="de-DE" noProof="0"/>
           </a:p>
@@ -6723,7 +6723,7 @@
             <a:pPr rtl="0"/>
             <a:fld id="{BEAF72EF-425A-4F6A-A9DF-BED983E036CE}" type="datetime1">
               <a:rPr lang="de-DE" noProof="0" smtClean="0"/>
-              <a:t>06.12.2024</a:t>
+              <a:t>09.12.2024</a:t>
             </a:fld>
             <a:endParaRPr lang="de-DE" noProof="0"/>
           </a:p>
@@ -7104,7 +7104,7 @@
             <a:pPr rtl="0"/>
             <a:fld id="{5DD1D9C0-19C2-46D6-86BD-B08A52EFA2D7}" type="datetime1">
               <a:rPr lang="de-DE" noProof="0" smtClean="0"/>
-              <a:t>06.12.2024</a:t>
+              <a:t>09.12.2024</a:t>
             </a:fld>
             <a:endParaRPr lang="de-DE" noProof="0" dirty="0"/>
           </a:p>
@@ -7397,7 +7397,7 @@
             <a:pPr rtl="0"/>
             <a:fld id="{48A6D0C3-ABBE-4FF9-B6A5-41CEB5B074A7}" type="datetime1">
               <a:rPr lang="de-DE" noProof="0" smtClean="0"/>
-              <a:t>06.12.2024</a:t>
+              <a:t>09.12.2024</a:t>
             </a:fld>
             <a:endParaRPr lang="de-DE" noProof="0"/>
           </a:p>
@@ -7611,7 +7611,7 @@
             <a:pPr rtl="0"/>
             <a:fld id="{6E85E8B8-8A4A-40B2-9EEA-E137A622436D}" type="datetime1">
               <a:rPr lang="de-DE" noProof="0" smtClean="0"/>
-              <a:t>06.12.2024</a:t>
+              <a:t>09.12.2024</a:t>
             </a:fld>
             <a:endParaRPr lang="de-DE" noProof="0" dirty="0"/>
           </a:p>
@@ -9237,15 +9237,6 @@
           <a:solidFill>
             <a:srgbClr val="FFFFFF"/>
           </a:solidFill>
-          <a:extLst>
-            <a:ext uri="{909E8E84-426E-40DD-AFC4-6F175D3DCCD1}">
-              <a14:hiddenFill xmlns:a14="http://schemas.microsoft.com/office/drawing/2010/main">
-                <a:solidFill>
-                  <a:srgbClr val="FFFFFF"/>
-                </a:solidFill>
-              </a14:hiddenFill>
-            </a:ext>
-          </a:extLst>
         </p:spPr>
       </p:pic>
       <p:sp>
@@ -9463,15 +9454,6 @@
           <a:solidFill>
             <a:srgbClr val="FFFFFF"/>
           </a:solidFill>
-          <a:extLst>
-            <a:ext uri="{909E8E84-426E-40DD-AFC4-6F175D3DCCD1}">
-              <a14:hiddenFill xmlns:a14="http://schemas.microsoft.com/office/drawing/2010/main">
-                <a:solidFill>
-                  <a:srgbClr val="FFFFFF"/>
-                </a:solidFill>
-              </a14:hiddenFill>
-            </a:ext>
-          </a:extLst>
         </p:spPr>
       </p:pic>
       <p:sp>
@@ -10155,19 +10137,19 @@
           <a:p>
             <a:pPr lvl="1"/>
             <a:r>
+              <a:rPr lang="de-DE" sz="1800" dirty="0"/>
+              <a:t>Abhängigkeiten installieren</a:t>
+            </a:r>
+          </a:p>
+          <a:p>
+            <a:pPr lvl="1"/>
+            <a:r>
               <a:rPr lang="de-DE" sz="1800" dirty="0" err="1"/>
               <a:t>Konfig</a:t>
             </a:r>
             <a:r>
               <a:rPr lang="de-DE" sz="1800" dirty="0"/>
               <a:t>-Dateien anpassen</a:t>
-            </a:r>
-          </a:p>
-          <a:p>
-            <a:pPr lvl="1"/>
-            <a:r>
-              <a:rPr lang="de-DE" sz="1800" dirty="0"/>
-              <a:t>Abhängigkeiten installieren</a:t>
             </a:r>
           </a:p>
           <a:p>

</xml_diff>